<commit_message>
Changed E24.pptx to avoid overlap
</commit_message>
<xml_diff>
--- a/PPTX/E24.pptx
+++ b/PPTX/E24.pptx
@@ -220,7 +220,7 @@
           <a:p>
             <a:fld id="{64C7C0CB-61BA-9046-A1DF-7284E38B9F80}" type="datetimeFigureOut">
               <a:rPr lang="es-PA" smtClean="0"/>
-              <a:t>18/8/20</a:t>
+              <a:t>2/12/20</a:t>
             </a:fld>
             <a:endParaRPr lang="es-PA"/>
           </a:p>
@@ -594,7 +594,7 @@
           <a:p>
             <a:fld id="{BFB120B0-2BAF-C849-945E-F9FEF71CE641}" type="datetimeFigureOut">
               <a:rPr lang="es-PA" smtClean="0"/>
-              <a:t>18/8/20</a:t>
+              <a:t>2/12/20</a:t>
             </a:fld>
             <a:endParaRPr lang="es-PA"/>
           </a:p>
@@ -740,7 +740,7 @@
           <a:p>
             <a:fld id="{BFB120B0-2BAF-C849-945E-F9FEF71CE641}" type="datetimeFigureOut">
               <a:rPr lang="es-PA" smtClean="0"/>
-              <a:t>18/8/20</a:t>
+              <a:t>2/12/20</a:t>
             </a:fld>
             <a:endParaRPr lang="es-PA"/>
           </a:p>
@@ -896,7 +896,7 @@
           <a:p>
             <a:fld id="{BFB120B0-2BAF-C849-945E-F9FEF71CE641}" type="datetimeFigureOut">
               <a:rPr lang="es-PA" smtClean="0"/>
-              <a:t>18/8/20</a:t>
+              <a:t>2/12/20</a:t>
             </a:fld>
             <a:endParaRPr lang="es-PA"/>
           </a:p>
@@ -1042,7 +1042,7 @@
           <a:p>
             <a:fld id="{BFB120B0-2BAF-C849-945E-F9FEF71CE641}" type="datetimeFigureOut">
               <a:rPr lang="es-PA" smtClean="0"/>
-              <a:t>18/8/20</a:t>
+              <a:t>2/12/20</a:t>
             </a:fld>
             <a:endParaRPr lang="es-PA"/>
           </a:p>
@@ -1291,7 +1291,7 @@
           <a:p>
             <a:fld id="{BFB120B0-2BAF-C849-945E-F9FEF71CE641}" type="datetimeFigureOut">
               <a:rPr lang="es-PA" smtClean="0"/>
-              <a:t>18/8/20</a:t>
+              <a:t>2/12/20</a:t>
             </a:fld>
             <a:endParaRPr lang="es-PA"/>
           </a:p>
@@ -1439,7 +1439,7 @@
           <a:p>
             <a:fld id="{BFB120B0-2BAF-C849-945E-F9FEF71CE641}" type="datetimeFigureOut">
               <a:rPr lang="es-PA" smtClean="0"/>
-              <a:t>18/8/20</a:t>
+              <a:t>2/12/20</a:t>
             </a:fld>
             <a:endParaRPr lang="es-PA"/>
           </a:p>
@@ -1505,7 +1505,7 @@
         </p:nvSpPr>
         <p:spPr>
           <a:xfrm>
-            <a:off x="5227638" y="5597525"/>
+            <a:off x="5227638" y="5836012"/>
             <a:ext cx="3787775" cy="579438"/>
           </a:xfrm>
         </p:spPr>
@@ -1806,7 +1806,7 @@
           <a:p>
             <a:fld id="{BFB120B0-2BAF-C849-945E-F9FEF71CE641}" type="datetimeFigureOut">
               <a:rPr lang="es-PA" smtClean="0"/>
-              <a:t>18/8/20</a:t>
+              <a:t>2/12/20</a:t>
             </a:fld>
             <a:endParaRPr lang="es-PA"/>
           </a:p>
@@ -1924,7 +1924,7 @@
           <a:p>
             <a:fld id="{BFB120B0-2BAF-C849-945E-F9FEF71CE641}" type="datetimeFigureOut">
               <a:rPr lang="es-PA" smtClean="0"/>
-              <a:t>18/8/20</a:t>
+              <a:t>2/12/20</a:t>
             </a:fld>
             <a:endParaRPr lang="es-PA"/>
           </a:p>
@@ -2019,7 +2019,7 @@
           <a:p>
             <a:fld id="{BFB120B0-2BAF-C849-945E-F9FEF71CE641}" type="datetimeFigureOut">
               <a:rPr lang="es-PA" smtClean="0"/>
-              <a:t>18/8/20</a:t>
+              <a:t>2/12/20</a:t>
             </a:fld>
             <a:endParaRPr lang="es-PA"/>
           </a:p>
@@ -2277,7 +2277,7 @@
           <a:p>
             <a:fld id="{BFB120B0-2BAF-C849-945E-F9FEF71CE641}" type="datetimeFigureOut">
               <a:rPr lang="es-PA" smtClean="0"/>
-              <a:t>18/8/20</a:t>
+              <a:t>2/12/20</a:t>
             </a:fld>
             <a:endParaRPr lang="es-PA"/>
           </a:p>
@@ -2539,7 +2539,7 @@
           <a:p>
             <a:fld id="{BFB120B0-2BAF-C849-945E-F9FEF71CE641}" type="datetimeFigureOut">
               <a:rPr lang="es-PA" smtClean="0"/>
-              <a:t>18/8/20</a:t>
+              <a:t>2/12/20</a:t>
             </a:fld>
             <a:endParaRPr lang="es-PA"/>
           </a:p>
@@ -2742,7 +2742,7 @@
           <a:p>
             <a:fld id="{BFB120B0-2BAF-C849-945E-F9FEF71CE641}" type="datetimeFigureOut">
               <a:rPr lang="es-PA" smtClean="0"/>
-              <a:t>18/8/20</a:t>
+              <a:t>2/12/20</a:t>
             </a:fld>
             <a:endParaRPr lang="es-PA"/>
           </a:p>

</xml_diff>